<commit_message>
Update Term project proposal - 21812009 조은영.pptx
</commit_message>
<xml_diff>
--- a/200605/Term project proposal - 21812009 조은영.pptx
+++ b/200605/Term project proposal - 21812009 조은영.pptx
@@ -3627,7 +3627,7 @@
     <mc:Choice Requires="p14">
       <p:transition/>
     </mc:Choice>
-    <mc:Fallback xmlns:dsp="http://schemas.microsoft.com/office/drawing/2008/diagram" xmlns:dgm="http://schemas.openxmlformats.org/drawingml/2006/diagram" xmlns:c="http://schemas.openxmlformats.org/drawingml/2006/chart" xmlns="">
+    <mc:Fallback xmlns="" xmlns:c="http://schemas.openxmlformats.org/drawingml/2006/chart" xmlns:dgm="http://schemas.openxmlformats.org/drawingml/2006/diagram" xmlns:dsp="http://schemas.microsoft.com/office/drawing/2008/diagram">
       <p:transition/>
     </mc:Fallback>
   </mc:AlternateContent>
@@ -4163,7 +4163,7 @@
     <mc:Choice Requires="p14">
       <p:transition/>
     </mc:Choice>
-    <mc:Fallback xmlns:dsp="http://schemas.microsoft.com/office/drawing/2008/diagram" xmlns:dgm="http://schemas.openxmlformats.org/drawingml/2006/diagram" xmlns:c="http://schemas.openxmlformats.org/drawingml/2006/chart" xmlns="">
+    <mc:Fallback xmlns="" xmlns:c="http://schemas.openxmlformats.org/drawingml/2006/chart" xmlns:dgm="http://schemas.openxmlformats.org/drawingml/2006/diagram" xmlns:dsp="http://schemas.microsoft.com/office/drawing/2008/diagram">
       <p:transition/>
     </mc:Fallback>
   </mc:AlternateContent>
@@ -4758,7 +4758,7 @@
     <mc:Choice Requires="p14">
       <p:transition/>
     </mc:Choice>
-    <mc:Fallback xmlns:dsp="http://schemas.microsoft.com/office/drawing/2008/diagram" xmlns:dgm="http://schemas.openxmlformats.org/drawingml/2006/diagram" xmlns:c="http://schemas.openxmlformats.org/drawingml/2006/chart" xmlns="">
+    <mc:Fallback xmlns="" xmlns:c="http://schemas.openxmlformats.org/drawingml/2006/chart" xmlns:dgm="http://schemas.openxmlformats.org/drawingml/2006/diagram" xmlns:dsp="http://schemas.microsoft.com/office/drawing/2008/diagram">
       <p:transition/>
     </mc:Fallback>
   </mc:AlternateContent>
@@ -6124,7 +6124,7 @@
     <mc:Choice Requires="p14">
       <p:transition/>
     </mc:Choice>
-    <mc:Fallback xmlns:dsp="http://schemas.microsoft.com/office/drawing/2008/diagram" xmlns:dgm="http://schemas.openxmlformats.org/drawingml/2006/diagram" xmlns:c="http://schemas.openxmlformats.org/drawingml/2006/chart" xmlns="">
+    <mc:Fallback xmlns="" xmlns:c="http://schemas.openxmlformats.org/drawingml/2006/chart" xmlns:dgm="http://schemas.openxmlformats.org/drawingml/2006/diagram" xmlns:dsp="http://schemas.microsoft.com/office/drawing/2008/diagram">
       <p:transition/>
     </mc:Fallback>
   </mc:AlternateContent>
@@ -6920,7 +6920,7 @@
     <mc:Choice Requires="p14">
       <p:transition/>
     </mc:Choice>
-    <mc:Fallback xmlns:dsp="http://schemas.microsoft.com/office/drawing/2008/diagram" xmlns:dgm="http://schemas.openxmlformats.org/drawingml/2006/diagram" xmlns:c="http://schemas.openxmlformats.org/drawingml/2006/chart" xmlns="">
+    <mc:Fallback xmlns="" xmlns:c="http://schemas.openxmlformats.org/drawingml/2006/chart" xmlns:dgm="http://schemas.openxmlformats.org/drawingml/2006/diagram" xmlns:dsp="http://schemas.microsoft.com/office/drawing/2008/diagram">
       <p:transition/>
     </mc:Fallback>
   </mc:AlternateContent>
@@ -7306,7 +7306,7 @@
                   <a:latin typeface="바탕"/>
                   <a:ea typeface="바탕"/>
                 </a:rPr>
-                <a:t>구현은 대략적만 </a:t>
+                <a:t>구현은 대략적으로만 </a:t>
               </a:r>
               <a:r>
                 <a:rPr lang="ko-KR" altLang="en-US" sz="1200" dirty="0" err="1">
@@ -8270,7 +8270,7 @@
     <mc:Choice Requires="p14">
       <p:transition/>
     </mc:Choice>
-    <mc:Fallback xmlns:dsp="http://schemas.microsoft.com/office/drawing/2008/diagram" xmlns:dgm="http://schemas.openxmlformats.org/drawingml/2006/diagram" xmlns:c="http://schemas.openxmlformats.org/drawingml/2006/chart" xmlns="">
+    <mc:Fallback xmlns="" xmlns:c="http://schemas.openxmlformats.org/drawingml/2006/chart" xmlns:dgm="http://schemas.openxmlformats.org/drawingml/2006/diagram" xmlns:dsp="http://schemas.microsoft.com/office/drawing/2008/diagram">
       <p:transition/>
     </mc:Fallback>
   </mc:AlternateContent>
@@ -9318,7 +9318,7 @@
     <mc:Choice Requires="p14">
       <p:transition/>
     </mc:Choice>
-    <mc:Fallback xmlns:dsp="http://schemas.microsoft.com/office/drawing/2008/diagram" xmlns:dgm="http://schemas.openxmlformats.org/drawingml/2006/diagram" xmlns:c="http://schemas.openxmlformats.org/drawingml/2006/chart" xmlns="">
+    <mc:Fallback xmlns="" xmlns:c="http://schemas.openxmlformats.org/drawingml/2006/chart" xmlns:dgm="http://schemas.openxmlformats.org/drawingml/2006/diagram" xmlns:dsp="http://schemas.microsoft.com/office/drawing/2008/diagram">
       <p:transition/>
     </mc:Fallback>
   </mc:AlternateContent>
@@ -9477,7 +9477,7 @@
     <mc:Choice Requires="p14">
       <p:transition/>
     </mc:Choice>
-    <mc:Fallback xmlns:dsp="http://schemas.microsoft.com/office/drawing/2008/diagram" xmlns:dgm="http://schemas.openxmlformats.org/drawingml/2006/diagram" xmlns:c="http://schemas.openxmlformats.org/drawingml/2006/chart" xmlns="">
+    <mc:Fallback xmlns="" xmlns:c="http://schemas.openxmlformats.org/drawingml/2006/chart" xmlns:dgm="http://schemas.openxmlformats.org/drawingml/2006/diagram" xmlns:dsp="http://schemas.microsoft.com/office/drawing/2008/diagram">
       <p:transition/>
     </mc:Fallback>
   </mc:AlternateContent>

</xml_diff>